<commit_message>
Modification du fichier presentations et corrections de quelques erreurs
</commit_message>
<xml_diff>
--- a/Presentation.pptx
+++ b/Presentation.pptx
@@ -19,22 +19,29 @@
   <p:notesSz cx="6858000" cy="9144000"/>
   <p:embeddedFontLst>
     <p:embeddedFont>
+      <p:font typeface="Cascadia Code" panose="020B0609020000020004" pitchFamily="49" charset="0"/>
+      <p:regular r:id="rId9"/>
+      <p:bold r:id="rId10"/>
+      <p:italic r:id="rId11"/>
+      <p:boldItalic r:id="rId12"/>
+    </p:embeddedFont>
+    <p:embeddedFont>
       <p:font typeface="Open Sans Extra Bold" panose="020B0604020202020204" charset="0"/>
-      <p:regular r:id="rId9"/>
+      <p:regular r:id="rId13"/>
     </p:embeddedFont>
     <p:embeddedFont>
       <p:font typeface="Poppins" panose="00000500000000000000" pitchFamily="2" charset="0"/>
-      <p:regular r:id="rId10"/>
-      <p:bold r:id="rId11"/>
-      <p:italic r:id="rId12"/>
-      <p:boldItalic r:id="rId13"/>
-    </p:embeddedFont>
-    <p:embeddedFont>
-      <p:font typeface="Roboto" panose="02000000000000000000" pitchFamily="2" charset="0"/>
       <p:regular r:id="rId14"/>
       <p:bold r:id="rId15"/>
       <p:italic r:id="rId16"/>
       <p:boldItalic r:id="rId17"/>
+    </p:embeddedFont>
+    <p:embeddedFont>
+      <p:font typeface="Roboto" panose="02000000000000000000" pitchFamily="2" charset="0"/>
+      <p:regular r:id="rId18"/>
+      <p:bold r:id="rId19"/>
+      <p:italic r:id="rId20"/>
+      <p:boldItalic r:id="rId21"/>
     </p:embeddedFont>
   </p:embeddedFontLst>
   <p:defaultTextStyle>
@@ -4626,59 +4633,6 @@
       </p:sp>
       <p:sp>
         <p:nvSpPr>
-          <p:cNvPr id="10" name="Freeform 10"/>
-          <p:cNvSpPr/>
-          <p:nvPr/>
-        </p:nvSpPr>
-        <p:spPr>
-          <a:xfrm>
-            <a:off x="13633956" y="195309"/>
-            <a:ext cx="5396438" cy="9392508"/>
-          </a:xfrm>
-          <a:custGeom>
-            <a:avLst/>
-            <a:gdLst/>
-            <a:ahLst/>
-            <a:cxnLst/>
-            <a:rect l="l" t="t" r="r" b="b"/>
-            <a:pathLst>
-              <a:path w="5972616" h="9392508">
-                <a:moveTo>
-                  <a:pt x="0" y="0"/>
-                </a:moveTo>
-                <a:lnTo>
-                  <a:pt x="5972616" y="0"/>
-                </a:lnTo>
-                <a:lnTo>
-                  <a:pt x="5972616" y="9392508"/>
-                </a:lnTo>
-                <a:lnTo>
-                  <a:pt x="0" y="9392508"/>
-                </a:lnTo>
-                <a:lnTo>
-                  <a:pt x="0" y="0"/>
-                </a:lnTo>
-                <a:close/>
-              </a:path>
-            </a:pathLst>
-          </a:custGeom>
-          <a:blipFill>
-            <a:blip r:embed="rId4"/>
-            <a:stretch>
-              <a:fillRect l="-2387" r="-2387"/>
-            </a:stretch>
-          </a:blipFill>
-        </p:spPr>
-        <p:txBody>
-          <a:bodyPr/>
-          <a:lstStyle/>
-          <a:p>
-            <a:endParaRPr lang="fr-FR" noProof="0" dirty="0"/>
-          </a:p>
-        </p:txBody>
-      </p:sp>
-      <p:sp>
-        <p:nvSpPr>
           <p:cNvPr id="11" name="TextBox 11"/>
           <p:cNvSpPr txBox="1"/>
           <p:nvPr/>
@@ -5248,6 +5202,53 @@
           </a:p>
         </p:txBody>
       </p:sp>
+      <p:pic>
+        <p:nvPicPr>
+          <p:cNvPr id="12" name="Picture 4" descr="Carte du Togo - Plusieurs cartes du pays en Afrique">
+            <a:extLst>
+              <a:ext uri="{FF2B5EF4-FFF2-40B4-BE49-F238E27FC236}">
+                <a16:creationId xmlns:a16="http://schemas.microsoft.com/office/drawing/2014/main" id="{E1E4E015-C898-CFA2-2D06-C2EB2309CE40}"/>
+              </a:ext>
+            </a:extLst>
+          </p:cNvPr>
+          <p:cNvPicPr>
+            <a:picLocks noChangeAspect="1" noChangeArrowheads="1"/>
+          </p:cNvPicPr>
+          <p:nvPr/>
+        </p:nvPicPr>
+        <p:blipFill>
+          <a:blip r:embed="rId4">
+            <a:extLst>
+              <a:ext uri="{28A0092B-C50C-407E-A947-70E740481C1C}">
+                <a14:useLocalDpi xmlns:a14="http://schemas.microsoft.com/office/drawing/2010/main" val="0"/>
+              </a:ext>
+            </a:extLst>
+          </a:blip>
+          <a:srcRect/>
+          <a:stretch>
+            <a:fillRect/>
+          </a:stretch>
+        </p:blipFill>
+        <p:spPr bwMode="auto">
+          <a:xfrm>
+            <a:off x="11037008" y="0"/>
+            <a:ext cx="4619443" cy="10287000"/>
+          </a:xfrm>
+          <a:prstGeom prst="rect">
+            <a:avLst/>
+          </a:prstGeom>
+          <a:noFill/>
+          <a:extLst>
+            <a:ext uri="{909E8E84-426E-40DD-AFC4-6F175D3DCCD1}">
+              <a14:hiddenFill xmlns:a14="http://schemas.microsoft.com/office/drawing/2010/main">
+                <a:solidFill>
+                  <a:srgbClr val="FFFFFF"/>
+                </a:solidFill>
+              </a14:hiddenFill>
+            </a:ext>
+          </a:extLst>
+        </p:spPr>
+      </p:pic>
     </p:spTree>
   </p:cSld>
   <p:clrMapOvr>
@@ -5402,7 +5403,7 @@
         </p:nvGrpSpPr>
         <p:grpSpPr>
           <a:xfrm>
-            <a:off x="-5976833" y="126757"/>
+            <a:off x="-6042805" y="98991"/>
             <a:ext cx="11387033" cy="11849728"/>
             <a:chOff x="0" y="0"/>
             <a:chExt cx="812800" cy="812800"/>
@@ -5506,7 +5507,7 @@
         </p:nvSpPr>
         <p:spPr>
           <a:xfrm>
-            <a:off x="-2858944" y="5233576"/>
+            <a:off x="1090996" y="4259047"/>
             <a:ext cx="6033363" cy="1636089"/>
           </a:xfrm>
           <a:prstGeom prst="rect">
@@ -8737,6 +8738,142 @@
           </a:p>
         </p:txBody>
       </p:sp>
+      <p:graphicFrame>
+        <p:nvGraphicFramePr>
+          <p:cNvPr id="3" name="Tableau 2">
+            <a:extLst>
+              <a:ext uri="{FF2B5EF4-FFF2-40B4-BE49-F238E27FC236}">
+                <a16:creationId xmlns:a16="http://schemas.microsoft.com/office/drawing/2014/main" id="{8BFEA54A-AA90-3DBB-3636-E9168B3F2665}"/>
+              </a:ext>
+            </a:extLst>
+          </p:cNvPr>
+          <p:cNvGraphicFramePr>
+            <a:graphicFrameLocks noGrp="1"/>
+          </p:cNvGraphicFramePr>
+          <p:nvPr>
+            <p:extLst>
+              <p:ext uri="{D42A27DB-BD31-4B8C-83A1-F6EECF244321}">
+                <p14:modId xmlns:p14="http://schemas.microsoft.com/office/powerpoint/2010/main" val="734778594"/>
+              </p:ext>
+            </p:extLst>
+          </p:nvPr>
+        </p:nvGraphicFramePr>
+        <p:xfrm>
+          <a:off x="2604118" y="5174974"/>
+          <a:ext cx="4025282" cy="579120"/>
+        </p:xfrm>
+        <a:graphic>
+          <a:graphicData uri="http://schemas.openxmlformats.org/drawingml/2006/table">
+            <a:tbl>
+              <a:tblPr firstRow="1" bandRow="1">
+                <a:tableStyleId>{5C22544A-7EE6-4342-B048-85BDC9FD1C3A}</a:tableStyleId>
+              </a:tblPr>
+              <a:tblGrid>
+                <a:gridCol w="4025282">
+                  <a:extLst>
+                    <a:ext uri="{9D8B030D-6E8A-4147-A177-3AD203B41FA5}">
+                      <a16:colId xmlns:a16="http://schemas.microsoft.com/office/drawing/2014/main" val="1408732142"/>
+                    </a:ext>
+                  </a:extLst>
+                </a:gridCol>
+              </a:tblGrid>
+              <a:tr h="370840">
+                <a:tc>
+                  <a:txBody>
+                    <a:bodyPr/>
+                    <a:lstStyle/>
+                    <a:p>
+                      <a:pPr algn="ctr"/>
+                      <a:r>
+                        <a:rPr lang="en-US" sz="3200" dirty="0">
+                          <a:latin typeface="Cascadia Code" panose="020B0609020000020004" pitchFamily="49" charset="0"/>
+                          <a:ea typeface="Cascadia Code" panose="020B0609020000020004" pitchFamily="49" charset="0"/>
+                          <a:cs typeface="Cascadia Code" panose="020B0609020000020004" pitchFamily="49" charset="0"/>
+                        </a:rPr>
+                        <a:t>Recommendations</a:t>
+                      </a:r>
+                    </a:p>
+                  </a:txBody>
+                  <a:tcPr/>
+                </a:tc>
+                <a:extLst>
+                  <a:ext uri="{0D108BD9-81ED-4DB2-BD59-A6C34878D82A}">
+                    <a16:rowId xmlns:a16="http://schemas.microsoft.com/office/drawing/2014/main" val="454837021"/>
+                  </a:ext>
+                </a:extLst>
+              </a:tr>
+            </a:tbl>
+          </a:graphicData>
+        </a:graphic>
+      </p:graphicFrame>
+      <p:graphicFrame>
+        <p:nvGraphicFramePr>
+          <p:cNvPr id="5" name="Tableau 4">
+            <a:extLst>
+              <a:ext uri="{FF2B5EF4-FFF2-40B4-BE49-F238E27FC236}">
+                <a16:creationId xmlns:a16="http://schemas.microsoft.com/office/drawing/2014/main" id="{1205CC57-231C-A2C1-3FE3-DA75A7947ED7}"/>
+              </a:ext>
+            </a:extLst>
+          </p:cNvPr>
+          <p:cNvGraphicFramePr>
+            <a:graphicFrameLocks noGrp="1"/>
+          </p:cNvGraphicFramePr>
+          <p:nvPr>
+            <p:extLst>
+              <p:ext uri="{D42A27DB-BD31-4B8C-83A1-F6EECF244321}">
+                <p14:modId xmlns:p14="http://schemas.microsoft.com/office/powerpoint/2010/main" val="1388418574"/>
+              </p:ext>
+            </p:extLst>
+          </p:nvPr>
+        </p:nvGraphicFramePr>
+        <p:xfrm>
+          <a:off x="11353800" y="4935965"/>
+          <a:ext cx="4025282" cy="579120"/>
+        </p:xfrm>
+        <a:graphic>
+          <a:graphicData uri="http://schemas.openxmlformats.org/drawingml/2006/table">
+            <a:tbl>
+              <a:tblPr firstRow="1" bandRow="1">
+                <a:tableStyleId>{5C22544A-7EE6-4342-B048-85BDC9FD1C3A}</a:tableStyleId>
+              </a:tblPr>
+              <a:tblGrid>
+                <a:gridCol w="4025282">
+                  <a:extLst>
+                    <a:ext uri="{9D8B030D-6E8A-4147-A177-3AD203B41FA5}">
+                      <a16:colId xmlns:a16="http://schemas.microsoft.com/office/drawing/2014/main" val="1408732142"/>
+                    </a:ext>
+                  </a:extLst>
+                </a:gridCol>
+              </a:tblGrid>
+              <a:tr h="370840">
+                <a:tc>
+                  <a:txBody>
+                    <a:bodyPr/>
+                    <a:lstStyle/>
+                    <a:p>
+                      <a:pPr algn="ctr"/>
+                      <a:r>
+                        <a:rPr lang="en-US" sz="3200" dirty="0">
+                          <a:latin typeface="Cascadia Code" panose="020B0609020000020004" pitchFamily="49" charset="0"/>
+                          <a:ea typeface="Cascadia Code" panose="020B0609020000020004" pitchFamily="49" charset="0"/>
+                          <a:cs typeface="Cascadia Code" panose="020B0609020000020004" pitchFamily="49" charset="0"/>
+                        </a:rPr>
+                        <a:t>Perspectives</a:t>
+                      </a:r>
+                    </a:p>
+                  </a:txBody>
+                  <a:tcPr/>
+                </a:tc>
+                <a:extLst>
+                  <a:ext uri="{0D108BD9-81ED-4DB2-BD59-A6C34878D82A}">
+                    <a16:rowId xmlns:a16="http://schemas.microsoft.com/office/drawing/2014/main" val="454837021"/>
+                  </a:ext>
+                </a:extLst>
+              </a:tr>
+            </a:tbl>
+          </a:graphicData>
+        </a:graphic>
+      </p:graphicFrame>
     </p:spTree>
     <p:extLst>
       <p:ext uri="{BB962C8B-B14F-4D97-AF65-F5344CB8AC3E}">

</xml_diff>